<commit_message>
Updates to week 1 materials
</commit_message>
<xml_diff>
--- a/java-high-level-workflow.pptx
+++ b/java-high-level-workflow.pptx
@@ -3371,7 +3371,10 @@
           <a:bodyPr/>
           <a:lstStyle/>
           <a:p>
-            <a:endParaRPr lang="en-US"/>
+            <a:r>
+              <a:rPr lang="en-US" dirty="0"/>
+              <a:t>High Level Overview</a:t>
+            </a:r>
           </a:p>
         </p:txBody>
       </p:sp>

</xml_diff>